<commit_message>
I2C problems are fixed now, seems to work stable. Amended documentation
</commit_message>
<xml_diff>
--- a/doc/Walter Documentation.pptx
+++ b/doc/Walter Documentation.pptx
@@ -214,7 +214,7 @@
           <a:p>
             <a:fld id="{24CAD8AF-FB06-4225-9C3C-63F205CE0062}" type="datetimeFigureOut">
               <a:rPr lang="de-DE" smtClean="0"/>
-              <a:t>21.11.2016</a:t>
+              <a:t>24.12.2016</a:t>
             </a:fld>
             <a:endParaRPr lang="de-DE"/>
           </a:p>
@@ -831,7 +831,7 @@
           <a:p>
             <a:fld id="{1BA50D42-C9CD-4801-B293-61D1F53EC57E}" type="datetimeFigureOut">
               <a:rPr lang="de-DE" smtClean="0"/>
-              <a:t>21.11.2016</a:t>
+              <a:t>24.12.2016</a:t>
             </a:fld>
             <a:endParaRPr lang="de-DE"/>
           </a:p>
@@ -996,7 +996,7 @@
           <a:p>
             <a:fld id="{1BA50D42-C9CD-4801-B293-61D1F53EC57E}" type="datetimeFigureOut">
               <a:rPr lang="de-DE" smtClean="0"/>
-              <a:t>21.11.2016</a:t>
+              <a:t>24.12.2016</a:t>
             </a:fld>
             <a:endParaRPr lang="de-DE"/>
           </a:p>
@@ -1171,7 +1171,7 @@
           <a:p>
             <a:fld id="{1BA50D42-C9CD-4801-B293-61D1F53EC57E}" type="datetimeFigureOut">
               <a:rPr lang="de-DE" smtClean="0"/>
-              <a:t>21.11.2016</a:t>
+              <a:t>24.12.2016</a:t>
             </a:fld>
             <a:endParaRPr lang="de-DE"/>
           </a:p>
@@ -1336,7 +1336,7 @@
           <a:p>
             <a:fld id="{1BA50D42-C9CD-4801-B293-61D1F53EC57E}" type="datetimeFigureOut">
               <a:rPr lang="de-DE" smtClean="0"/>
-              <a:t>21.11.2016</a:t>
+              <a:t>24.12.2016</a:t>
             </a:fld>
             <a:endParaRPr lang="de-DE"/>
           </a:p>
@@ -1577,7 +1577,7 @@
           <a:p>
             <a:fld id="{1BA50D42-C9CD-4801-B293-61D1F53EC57E}" type="datetimeFigureOut">
               <a:rPr lang="de-DE" smtClean="0"/>
-              <a:t>21.11.2016</a:t>
+              <a:t>24.12.2016</a:t>
             </a:fld>
             <a:endParaRPr lang="de-DE"/>
           </a:p>
@@ -1860,7 +1860,7 @@
           <a:p>
             <a:fld id="{1BA50D42-C9CD-4801-B293-61D1F53EC57E}" type="datetimeFigureOut">
               <a:rPr lang="de-DE" smtClean="0"/>
-              <a:t>21.11.2016</a:t>
+              <a:t>24.12.2016</a:t>
             </a:fld>
             <a:endParaRPr lang="de-DE"/>
           </a:p>
@@ -2277,7 +2277,7 @@
           <a:p>
             <a:fld id="{1BA50D42-C9CD-4801-B293-61D1F53EC57E}" type="datetimeFigureOut">
               <a:rPr lang="de-DE" smtClean="0"/>
-              <a:t>21.11.2016</a:t>
+              <a:t>24.12.2016</a:t>
             </a:fld>
             <a:endParaRPr lang="de-DE"/>
           </a:p>
@@ -2390,7 +2390,7 @@
           <a:p>
             <a:fld id="{1BA50D42-C9CD-4801-B293-61D1F53EC57E}" type="datetimeFigureOut">
               <a:rPr lang="de-DE" smtClean="0"/>
-              <a:t>21.11.2016</a:t>
+              <a:t>24.12.2016</a:t>
             </a:fld>
             <a:endParaRPr lang="de-DE"/>
           </a:p>
@@ -2480,7 +2480,7 @@
           <a:p>
             <a:fld id="{1BA50D42-C9CD-4801-B293-61D1F53EC57E}" type="datetimeFigureOut">
               <a:rPr lang="de-DE" smtClean="0"/>
-              <a:t>21.11.2016</a:t>
+              <a:t>24.12.2016</a:t>
             </a:fld>
             <a:endParaRPr lang="de-DE"/>
           </a:p>
@@ -2752,7 +2752,7 @@
           <a:p>
             <a:fld id="{1BA50D42-C9CD-4801-B293-61D1F53EC57E}" type="datetimeFigureOut">
               <a:rPr lang="de-DE" smtClean="0"/>
-              <a:t>21.11.2016</a:t>
+              <a:t>24.12.2016</a:t>
             </a:fld>
             <a:endParaRPr lang="de-DE"/>
           </a:p>
@@ -3000,7 +3000,7 @@
           <a:p>
             <a:fld id="{1BA50D42-C9CD-4801-B293-61D1F53EC57E}" type="datetimeFigureOut">
               <a:rPr lang="de-DE" smtClean="0"/>
-              <a:t>21.11.2016</a:t>
+              <a:t>24.12.2016</a:t>
             </a:fld>
             <a:endParaRPr lang="de-DE"/>
           </a:p>
@@ -3208,7 +3208,7 @@
           <a:p>
             <a:fld id="{1BA50D42-C9CD-4801-B293-61D1F53EC57E}" type="datetimeFigureOut">
               <a:rPr lang="de-DE" smtClean="0"/>
-              <a:t>21.11.2016</a:t>
+              <a:t>24.12.2016</a:t>
             </a:fld>
             <a:endParaRPr lang="de-DE"/>
           </a:p>
@@ -13245,19 +13245,16 @@
           <a:p>
             <a:pPr algn="ctr"/>
             <a:r>
-              <a:rPr lang="de-DE" sz="1050" dirty="0" err="1" smtClean="0">
-                <a:latin typeface="Segoe UI" panose="020B0502040204020203" pitchFamily="34" charset="0"/>
-                <a:cs typeface="Segoe UI" panose="020B0502040204020203" pitchFamily="34" charset="0"/>
-              </a:rPr>
-              <a:t>Atmega</a:t>
-            </a:r>
-            <a:r>
               <a:rPr lang="de-DE" sz="1050" dirty="0" smtClean="0">
                 <a:latin typeface="Segoe UI" panose="020B0502040204020203" pitchFamily="34" charset="0"/>
                 <a:cs typeface="Segoe UI" panose="020B0502040204020203" pitchFamily="34" charset="0"/>
               </a:rPr>
-              <a:t> 644</a:t>
-            </a:r>
+              <a:t>ARM CortexM4</a:t>
+            </a:r>
+            <a:endParaRPr lang="de-DE" sz="1050" dirty="0" smtClean="0">
+              <a:latin typeface="Segoe UI" panose="020B0502040204020203" pitchFamily="34" charset="0"/>
+              <a:cs typeface="Segoe UI" panose="020B0502040204020203" pitchFamily="34" charset="0"/>
+            </a:endParaRPr>
           </a:p>
           <a:p>
             <a:pPr algn="ctr"/>
@@ -15081,28 +15078,11 @@
           <a:p>
             <a:pPr algn="ctr"/>
             <a:r>
-              <a:rPr lang="de-DE" sz="1050" dirty="0" err="1" smtClean="0">
-                <a:latin typeface="Segoe UI" panose="020B0502040204020203" pitchFamily="34" charset="0"/>
-                <a:cs typeface="Segoe UI" panose="020B0502040204020203" pitchFamily="34" charset="0"/>
-              </a:rPr>
-              <a:t>Atmega</a:t>
-            </a:r>
-            <a:r>
               <a:rPr lang="de-DE" sz="1050" dirty="0" smtClean="0">
                 <a:latin typeface="Segoe UI" panose="020B0502040204020203" pitchFamily="34" charset="0"/>
                 <a:cs typeface="Segoe UI" panose="020B0502040204020203" pitchFamily="34" charset="0"/>
               </a:rPr>
-              <a:t> 644</a:t>
-            </a:r>
-          </a:p>
-          <a:p>
-            <a:pPr algn="ctr"/>
-            <a:r>
-              <a:rPr lang="de-DE" sz="1050" dirty="0" smtClean="0">
-                <a:latin typeface="Segoe UI" panose="020B0502040204020203" pitchFamily="34" charset="0"/>
-                <a:cs typeface="Segoe UI" panose="020B0502040204020203" pitchFamily="34" charset="0"/>
-              </a:rPr>
-              <a:t>Low </a:t>
+              <a:t>Arm Cortex M4 Low </a:t>
             </a:r>
             <a:r>
               <a:rPr lang="de-DE" sz="1050" dirty="0" err="1" smtClean="0">

</xml_diff>